<commit_message>
feat: add theory of relationship and FK to `Aula 2`
</commit_message>
<xml_diff>
--- a/Aula 2/IntroduçãoBD.pptx
+++ b/Aula 2/IntroduçãoBD.pptx
@@ -10,8 +10,11 @@
     <p:sldId id="258" r:id="rId4"/>
     <p:sldId id="260" r:id="rId5"/>
     <p:sldId id="259" r:id="rId6"/>
-    <p:sldId id="263" r:id="rId7"/>
-    <p:sldId id="261" r:id="rId8"/>
+    <p:sldId id="271" r:id="rId7"/>
+    <p:sldId id="272" r:id="rId8"/>
+    <p:sldId id="264" r:id="rId9"/>
+    <p:sldId id="263" r:id="rId10"/>
+    <p:sldId id="261" r:id="rId11"/>
   </p:sldIdLst>
   <p:sldSz cx="12192000" cy="6858000"/>
   <p:notesSz cx="6858000" cy="9144000"/>
@@ -265,7 +268,7 @@
           <a:p>
             <a:fld id="{0293E696-207E-4958-8130-FF51108F7A86}" type="datetimeFigureOut">
               <a:rPr lang="pt-BR" smtClean="0"/>
-              <a:t>07/08/2025</a:t>
+              <a:t>23/01/2026</a:t>
             </a:fld>
             <a:endParaRPr lang="pt-BR"/>
           </a:p>
@@ -463,7 +466,7 @@
           <a:p>
             <a:fld id="{0293E696-207E-4958-8130-FF51108F7A86}" type="datetimeFigureOut">
               <a:rPr lang="pt-BR" smtClean="0"/>
-              <a:t>07/08/2025</a:t>
+              <a:t>23/01/2026</a:t>
             </a:fld>
             <a:endParaRPr lang="pt-BR"/>
           </a:p>
@@ -671,7 +674,7 @@
           <a:p>
             <a:fld id="{0293E696-207E-4958-8130-FF51108F7A86}" type="datetimeFigureOut">
               <a:rPr lang="pt-BR" smtClean="0"/>
-              <a:t>07/08/2025</a:t>
+              <a:t>23/01/2026</a:t>
             </a:fld>
             <a:endParaRPr lang="pt-BR"/>
           </a:p>
@@ -869,7 +872,7 @@
           <a:p>
             <a:fld id="{0293E696-207E-4958-8130-FF51108F7A86}" type="datetimeFigureOut">
               <a:rPr lang="pt-BR" smtClean="0"/>
-              <a:t>07/08/2025</a:t>
+              <a:t>23/01/2026</a:t>
             </a:fld>
             <a:endParaRPr lang="pt-BR"/>
           </a:p>
@@ -1144,7 +1147,7 @@
           <a:p>
             <a:fld id="{0293E696-207E-4958-8130-FF51108F7A86}" type="datetimeFigureOut">
               <a:rPr lang="pt-BR" smtClean="0"/>
-              <a:t>07/08/2025</a:t>
+              <a:t>23/01/2026</a:t>
             </a:fld>
             <a:endParaRPr lang="pt-BR"/>
           </a:p>
@@ -1409,7 +1412,7 @@
           <a:p>
             <a:fld id="{0293E696-207E-4958-8130-FF51108F7A86}" type="datetimeFigureOut">
               <a:rPr lang="pt-BR" smtClean="0"/>
-              <a:t>07/08/2025</a:t>
+              <a:t>23/01/2026</a:t>
             </a:fld>
             <a:endParaRPr lang="pt-BR"/>
           </a:p>
@@ -1821,7 +1824,7 @@
           <a:p>
             <a:fld id="{0293E696-207E-4958-8130-FF51108F7A86}" type="datetimeFigureOut">
               <a:rPr lang="pt-BR" smtClean="0"/>
-              <a:t>07/08/2025</a:t>
+              <a:t>23/01/2026</a:t>
             </a:fld>
             <a:endParaRPr lang="pt-BR"/>
           </a:p>
@@ -1962,7 +1965,7 @@
           <a:p>
             <a:fld id="{0293E696-207E-4958-8130-FF51108F7A86}" type="datetimeFigureOut">
               <a:rPr lang="pt-BR" smtClean="0"/>
-              <a:t>07/08/2025</a:t>
+              <a:t>23/01/2026</a:t>
             </a:fld>
             <a:endParaRPr lang="pt-BR"/>
           </a:p>
@@ -2075,7 +2078,7 @@
           <a:p>
             <a:fld id="{0293E696-207E-4958-8130-FF51108F7A86}" type="datetimeFigureOut">
               <a:rPr lang="pt-BR" smtClean="0"/>
-              <a:t>07/08/2025</a:t>
+              <a:t>23/01/2026</a:t>
             </a:fld>
             <a:endParaRPr lang="pt-BR"/>
           </a:p>
@@ -2386,7 +2389,7 @@
           <a:p>
             <a:fld id="{0293E696-207E-4958-8130-FF51108F7A86}" type="datetimeFigureOut">
               <a:rPr lang="pt-BR" smtClean="0"/>
-              <a:t>07/08/2025</a:t>
+              <a:t>23/01/2026</a:t>
             </a:fld>
             <a:endParaRPr lang="pt-BR"/>
           </a:p>
@@ -2674,7 +2677,7 @@
           <a:p>
             <a:fld id="{0293E696-207E-4958-8130-FF51108F7A86}" type="datetimeFigureOut">
               <a:rPr lang="pt-BR" smtClean="0"/>
-              <a:t>07/08/2025</a:t>
+              <a:t>23/01/2026</a:t>
             </a:fld>
             <a:endParaRPr lang="pt-BR"/>
           </a:p>
@@ -2915,7 +2918,7 @@
           <a:p>
             <a:fld id="{0293E696-207E-4958-8130-FF51108F7A86}" type="datetimeFigureOut">
               <a:rPr lang="pt-BR" smtClean="0"/>
-              <a:t>07/08/2025</a:t>
+              <a:t>23/01/2026</a:t>
             </a:fld>
             <a:endParaRPr lang="pt-BR"/>
           </a:p>
@@ -3581,6 +3584,177 @@
 </p:sld>
 </file>
 
+<file path=ppt/slides/slide10.xml><?xml version="1.0" encoding="utf-8"?>
+<p:sld xmlns:a="http://schemas.openxmlformats.org/drawingml/2006/main" xmlns:r="http://schemas.openxmlformats.org/officeDocument/2006/relationships" xmlns:p="http://schemas.openxmlformats.org/presentationml/2006/main">
+  <p:cSld>
+    <p:spTree>
+      <p:nvGrpSpPr>
+        <p:cNvPr id="1" name="">
+          <a:extLst>
+            <a:ext uri="{FF2B5EF4-FFF2-40B4-BE49-F238E27FC236}">
+              <a16:creationId xmlns:a16="http://schemas.microsoft.com/office/drawing/2014/main" id="{A9F73D6E-FC32-50DA-1CBC-9FDC465B155C}"/>
+            </a:ext>
+          </a:extLst>
+        </p:cNvPr>
+        <p:cNvGrpSpPr/>
+        <p:nvPr/>
+      </p:nvGrpSpPr>
+      <p:grpSpPr>
+        <a:xfrm>
+          <a:off x="0" y="0"/>
+          <a:ext cx="0" cy="0"/>
+          <a:chOff x="0" y="0"/>
+          <a:chExt cx="0" cy="0"/>
+        </a:xfrm>
+      </p:grpSpPr>
+      <p:sp>
+        <p:nvSpPr>
+          <p:cNvPr id="2" name="Título 1">
+            <a:extLst>
+              <a:ext uri="{FF2B5EF4-FFF2-40B4-BE49-F238E27FC236}">
+                <a16:creationId xmlns:a16="http://schemas.microsoft.com/office/drawing/2014/main" id="{7D33F163-C736-9349-5711-22D353FEFD1A}"/>
+              </a:ext>
+            </a:extLst>
+          </p:cNvPr>
+          <p:cNvSpPr>
+            <a:spLocks noGrp="1"/>
+          </p:cNvSpPr>
+          <p:nvPr>
+            <p:ph type="title"/>
+          </p:nvPr>
+        </p:nvSpPr>
+        <p:spPr/>
+        <p:txBody>
+          <a:bodyPr/>
+          <a:lstStyle/>
+          <a:p>
+            <a:endParaRPr lang="pt-BR"/>
+          </a:p>
+        </p:txBody>
+      </p:sp>
+      <p:sp>
+        <p:nvSpPr>
+          <p:cNvPr id="3" name="Espaço Reservado para Conteúdo 2">
+            <a:extLst>
+              <a:ext uri="{FF2B5EF4-FFF2-40B4-BE49-F238E27FC236}">
+                <a16:creationId xmlns:a16="http://schemas.microsoft.com/office/drawing/2014/main" id="{13625611-E7FA-1D72-494A-0AFBC3CF9FB2}"/>
+              </a:ext>
+            </a:extLst>
+          </p:cNvPr>
+          <p:cNvSpPr>
+            <a:spLocks noGrp="1"/>
+          </p:cNvSpPr>
+          <p:nvPr>
+            <p:ph idx="1"/>
+          </p:nvPr>
+        </p:nvSpPr>
+        <p:spPr/>
+        <p:txBody>
+          <a:bodyPr/>
+          <a:lstStyle/>
+          <a:p>
+            <a:endParaRPr lang="pt-BR"/>
+          </a:p>
+        </p:txBody>
+      </p:sp>
+      <p:pic>
+        <p:nvPicPr>
+          <p:cNvPr id="4" name="Imagem 3">
+            <a:extLst>
+              <a:ext uri="{FF2B5EF4-FFF2-40B4-BE49-F238E27FC236}">
+                <a16:creationId xmlns:a16="http://schemas.microsoft.com/office/drawing/2014/main" id="{743371B3-3339-12F0-DD89-453EBF0A0ED8}"/>
+              </a:ext>
+            </a:extLst>
+          </p:cNvPr>
+          <p:cNvPicPr>
+            <a:picLocks noChangeAspect="1"/>
+          </p:cNvPicPr>
+          <p:nvPr/>
+        </p:nvPicPr>
+        <p:blipFill>
+          <a:blip r:embed="rId2">
+            <a:extLst>
+              <a:ext uri="{28A0092B-C50C-407E-A947-70E740481C1C}">
+                <a14:useLocalDpi xmlns:a14="http://schemas.microsoft.com/office/drawing/2010/main" val="0"/>
+              </a:ext>
+            </a:extLst>
+          </a:blip>
+          <a:stretch>
+            <a:fillRect/>
+          </a:stretch>
+        </p:blipFill>
+        <p:spPr>
+          <a:xfrm>
+            <a:off x="0" y="0"/>
+            <a:ext cx="12192000" cy="6858000"/>
+          </a:xfrm>
+          <a:prstGeom prst="rect">
+            <a:avLst/>
+          </a:prstGeom>
+        </p:spPr>
+      </p:pic>
+      <p:sp>
+        <p:nvSpPr>
+          <p:cNvPr id="5" name="CaixaDeTexto 4">
+            <a:extLst>
+              <a:ext uri="{FF2B5EF4-FFF2-40B4-BE49-F238E27FC236}">
+                <a16:creationId xmlns:a16="http://schemas.microsoft.com/office/drawing/2014/main" id="{C30338DA-9061-D8D4-B5A5-66A14A047FD4}"/>
+              </a:ext>
+            </a:extLst>
+          </p:cNvPr>
+          <p:cNvSpPr txBox="1"/>
+          <p:nvPr/>
+        </p:nvSpPr>
+        <p:spPr>
+          <a:xfrm>
+            <a:off x="3924300" y="2413337"/>
+            <a:ext cx="4343400" cy="1938992"/>
+          </a:xfrm>
+          <a:prstGeom prst="rect">
+            <a:avLst/>
+          </a:prstGeom>
+          <a:noFill/>
+        </p:spPr>
+        <p:txBody>
+          <a:bodyPr wrap="square" rtlCol="0">
+            <a:spAutoFit/>
+          </a:bodyPr>
+          <a:lstStyle/>
+          <a:p>
+            <a:pPr algn="ctr"/>
+            <a:r>
+              <a:rPr lang="en-US" sz="6000" dirty="0">
+                <a:solidFill>
+                  <a:schemeClr val="accent5">
+                    <a:lumMod val="75000"/>
+                  </a:schemeClr>
+                </a:solidFill>
+              </a:rPr>
+              <a:t>AULA CONCLUÍDA!</a:t>
+            </a:r>
+            <a:endParaRPr lang="pt-BR" sz="6000" dirty="0">
+              <a:solidFill>
+                <a:schemeClr val="accent5">
+                  <a:lumMod val="75000"/>
+                </a:schemeClr>
+              </a:solidFill>
+            </a:endParaRPr>
+          </a:p>
+        </p:txBody>
+      </p:sp>
+    </p:spTree>
+    <p:extLst>
+      <p:ext uri="{BB962C8B-B14F-4D97-AF65-F5344CB8AC3E}">
+        <p14:creationId xmlns:p14="http://schemas.microsoft.com/office/powerpoint/2010/main" val="3532846639"/>
+      </p:ext>
+    </p:extLst>
+  </p:cSld>
+  <p:clrMapOvr>
+    <a:masterClrMapping/>
+  </p:clrMapOvr>
+</p:sld>
+</file>
+
 <file path=ppt/slides/slide2.xml><?xml version="1.0" encoding="utf-8"?>
 <p:sld xmlns:a="http://schemas.openxmlformats.org/drawingml/2006/main" xmlns:r="http://schemas.openxmlformats.org/officeDocument/2006/relationships" xmlns:p="http://schemas.openxmlformats.org/presentationml/2006/main">
   <p:cSld>
@@ -5288,7 +5462,7 @@
         <p:cNvPr id="1" name="">
           <a:extLst>
             <a:ext uri="{FF2B5EF4-FFF2-40B4-BE49-F238E27FC236}">
-              <a16:creationId xmlns:a16="http://schemas.microsoft.com/office/drawing/2014/main" id="{5E8A27A6-8EF8-12D8-8FD8-D7F39147A30A}"/>
+              <a16:creationId xmlns:a16="http://schemas.microsoft.com/office/drawing/2014/main" id="{4D5CAF60-821D-41B0-1321-DD12AD3E57C4}"/>
             </a:ext>
           </a:extLst>
         </p:cNvPr>
@@ -5303,62 +5477,12 @@
           <a:chExt cx="0" cy="0"/>
         </a:xfrm>
       </p:grpSpPr>
-      <p:sp>
-        <p:nvSpPr>
-          <p:cNvPr id="2" name="Título 1">
-            <a:extLst>
-              <a:ext uri="{FF2B5EF4-FFF2-40B4-BE49-F238E27FC236}">
-                <a16:creationId xmlns:a16="http://schemas.microsoft.com/office/drawing/2014/main" id="{6BF18DC9-5815-0212-B6E0-D8C10E6A492B}"/>
-              </a:ext>
-            </a:extLst>
-          </p:cNvPr>
-          <p:cNvSpPr>
-            <a:spLocks noGrp="1"/>
-          </p:cNvSpPr>
-          <p:nvPr>
-            <p:ph type="title"/>
-          </p:nvPr>
-        </p:nvSpPr>
-        <p:spPr/>
-        <p:txBody>
-          <a:bodyPr/>
-          <a:lstStyle/>
-          <a:p>
-            <a:endParaRPr lang="pt-BR"/>
-          </a:p>
-        </p:txBody>
-      </p:sp>
-      <p:sp>
-        <p:nvSpPr>
-          <p:cNvPr id="3" name="Espaço Reservado para Conteúdo 2">
-            <a:extLst>
-              <a:ext uri="{FF2B5EF4-FFF2-40B4-BE49-F238E27FC236}">
-                <a16:creationId xmlns:a16="http://schemas.microsoft.com/office/drawing/2014/main" id="{4A8E3B4E-2F8A-3689-618B-A91B245EFDE0}"/>
-              </a:ext>
-            </a:extLst>
-          </p:cNvPr>
-          <p:cNvSpPr>
-            <a:spLocks noGrp="1"/>
-          </p:cNvSpPr>
-          <p:nvPr>
-            <p:ph idx="1"/>
-          </p:nvPr>
-        </p:nvSpPr>
-        <p:spPr/>
-        <p:txBody>
-          <a:bodyPr/>
-          <a:lstStyle/>
-          <a:p>
-            <a:endParaRPr lang="pt-BR"/>
-          </a:p>
-        </p:txBody>
-      </p:sp>
       <p:pic>
         <p:nvPicPr>
-          <p:cNvPr id="4" name="Imagem 3">
-            <a:extLst>
-              <a:ext uri="{FF2B5EF4-FFF2-40B4-BE49-F238E27FC236}">
-                <a16:creationId xmlns:a16="http://schemas.microsoft.com/office/drawing/2014/main" id="{81421DD0-6686-3CBC-6B71-56FD159EB670}"/>
+          <p:cNvPr id="5" name="Imagem 4">
+            <a:extLst>
+              <a:ext uri="{FF2B5EF4-FFF2-40B4-BE49-F238E27FC236}">
+                <a16:creationId xmlns:a16="http://schemas.microsoft.com/office/drawing/2014/main" id="{F7610CA9-A525-DEF8-EFD5-D3278795D9E9}"/>
               </a:ext>
             </a:extLst>
           </p:cNvPr>
@@ -5389,252 +5513,40 @@
           </a:prstGeom>
         </p:spPr>
       </p:pic>
-      <p:sp>
-        <p:nvSpPr>
-          <p:cNvPr id="5" name="CaixaDeTexto 4">
-            <a:extLst>
-              <a:ext uri="{FF2B5EF4-FFF2-40B4-BE49-F238E27FC236}">
-                <a16:creationId xmlns:a16="http://schemas.microsoft.com/office/drawing/2014/main" id="{37296BF4-EF26-F538-26E9-4DC854B48CD9}"/>
-              </a:ext>
-            </a:extLst>
-          </p:cNvPr>
-          <p:cNvSpPr txBox="1"/>
+      <p:pic>
+        <p:nvPicPr>
+          <p:cNvPr id="3" name="Imagem 2">
+            <a:extLst>
+              <a:ext uri="{FF2B5EF4-FFF2-40B4-BE49-F238E27FC236}">
+                <a16:creationId xmlns:a16="http://schemas.microsoft.com/office/drawing/2014/main" id="{42BC9A07-F41E-C7CA-21D9-EBDF1B10FA58}"/>
+              </a:ext>
+            </a:extLst>
+          </p:cNvPr>
+          <p:cNvPicPr>
+            <a:picLocks noChangeAspect="1"/>
+          </p:cNvPicPr>
           <p:nvPr/>
-        </p:nvSpPr>
+        </p:nvPicPr>
+        <p:blipFill>
+          <a:blip r:embed="rId3"/>
+          <a:stretch>
+            <a:fillRect/>
+          </a:stretch>
+        </p:blipFill>
         <p:spPr>
           <a:xfrm>
-            <a:off x="386861" y="202223"/>
-            <a:ext cx="9064869" cy="2862322"/>
+            <a:off x="561202" y="623496"/>
+            <a:ext cx="11069595" cy="5611008"/>
           </a:xfrm>
           <a:prstGeom prst="rect">
             <a:avLst/>
           </a:prstGeom>
-          <a:noFill/>
-        </p:spPr>
-        <p:txBody>
-          <a:bodyPr wrap="square" rtlCol="0">
-            <a:spAutoFit/>
-          </a:bodyPr>
-          <a:lstStyle/>
-          <a:p>
-            <a:r>
-              <a:rPr lang="en-US" sz="3600" dirty="0" err="1"/>
-              <a:t>Instalação</a:t>
-            </a:r>
-            <a:r>
-              <a:rPr lang="en-US" sz="3600" dirty="0"/>
-              <a:t> do MySQL Workbench</a:t>
-            </a:r>
-          </a:p>
-          <a:p>
-            <a:endParaRPr lang="en-US" sz="3600" dirty="0"/>
-          </a:p>
-          <a:p>
-            <a:pPr marL="285750" indent="-285750">
-              <a:buFont typeface="Wingdings" panose="05000000000000000000" pitchFamily="2" charset="2"/>
-              <a:buChar char="Ø"/>
-            </a:pPr>
-            <a:r>
-              <a:rPr lang="en-US" dirty="0" err="1"/>
-              <a:t>Vídeo</a:t>
-            </a:r>
-            <a:r>
-              <a:rPr lang="en-US" dirty="0"/>
-              <a:t> com </a:t>
-            </a:r>
-            <a:r>
-              <a:rPr lang="en-US" dirty="0" err="1"/>
-              <a:t>os</a:t>
-            </a:r>
-            <a:r>
-              <a:rPr lang="en-US" dirty="0"/>
-              <a:t> </a:t>
-            </a:r>
-            <a:r>
-              <a:rPr lang="en-US" dirty="0" err="1"/>
-              <a:t>detalhes</a:t>
-            </a:r>
-            <a:r>
-              <a:rPr lang="en-US" dirty="0"/>
-              <a:t> da </a:t>
-            </a:r>
-            <a:r>
-              <a:rPr lang="en-US" dirty="0" err="1"/>
-              <a:t>instalação</a:t>
-            </a:r>
-            <a:r>
-              <a:rPr lang="en-US" dirty="0"/>
-              <a:t> no canal do Teams.</a:t>
-            </a:r>
-          </a:p>
-          <a:p>
-            <a:pPr marL="285750" indent="-285750">
-              <a:buFont typeface="Wingdings" panose="05000000000000000000" pitchFamily="2" charset="2"/>
-              <a:buChar char="Ø"/>
-            </a:pPr>
-            <a:r>
-              <a:rPr lang="en-US" dirty="0" err="1"/>
-              <a:t>Arquivo</a:t>
-            </a:r>
-            <a:r>
-              <a:rPr lang="en-US" dirty="0"/>
-              <a:t> com </a:t>
-            </a:r>
-            <a:r>
-              <a:rPr lang="en-US" dirty="0" err="1"/>
-              <a:t>todos</a:t>
-            </a:r>
-            <a:r>
-              <a:rPr lang="en-US" dirty="0"/>
-              <a:t> </a:t>
-            </a:r>
-            <a:r>
-              <a:rPr lang="en-US" dirty="0" err="1"/>
-              <a:t>os</a:t>
-            </a:r>
-            <a:r>
-              <a:rPr lang="en-US" dirty="0"/>
-              <a:t> </a:t>
-            </a:r>
-            <a:r>
-              <a:rPr lang="en-US" dirty="0" err="1"/>
-              <a:t>detalhes</a:t>
-            </a:r>
-            <a:r>
-              <a:rPr lang="en-US" dirty="0"/>
-              <a:t> no TEAMS </a:t>
-            </a:r>
-            <a:r>
-              <a:rPr lang="en-US" dirty="0" err="1"/>
-              <a:t>ou</a:t>
-            </a:r>
-            <a:r>
-              <a:rPr lang="en-US" dirty="0"/>
-              <a:t> no meu </a:t>
-            </a:r>
-            <a:r>
-              <a:rPr lang="en-US" dirty="0" err="1"/>
-              <a:t>repositório</a:t>
-            </a:r>
-            <a:r>
-              <a:rPr lang="en-US" dirty="0"/>
-              <a:t> da </a:t>
-            </a:r>
-            <a:r>
-              <a:rPr lang="en-US" dirty="0" err="1"/>
-              <a:t>disciplina</a:t>
-            </a:r>
-            <a:r>
-              <a:rPr lang="en-US" dirty="0"/>
-              <a:t> no </a:t>
-            </a:r>
-            <a:r>
-              <a:rPr lang="en-US" dirty="0" err="1"/>
-              <a:t>Github</a:t>
-            </a:r>
-            <a:r>
-              <a:rPr lang="en-US" dirty="0"/>
-              <a:t>.</a:t>
-            </a:r>
-          </a:p>
-          <a:p>
-            <a:pPr marL="285750" indent="-285750">
-              <a:buFont typeface="Wingdings" panose="05000000000000000000" pitchFamily="2" charset="2"/>
-              <a:buChar char="Ø"/>
-            </a:pPr>
-            <a:r>
-              <a:rPr lang="en-US" dirty="0"/>
-              <a:t>IMPORTANTE: para </a:t>
-            </a:r>
-            <a:r>
-              <a:rPr lang="en-US" dirty="0" err="1"/>
-              <a:t>facilitar</a:t>
-            </a:r>
-            <a:r>
-              <a:rPr lang="en-US" dirty="0"/>
-              <a:t> entradas posteriores (</a:t>
-            </a:r>
-            <a:r>
-              <a:rPr lang="en-US" dirty="0" err="1"/>
-              <a:t>principalmente</a:t>
-            </a:r>
-            <a:r>
-              <a:rPr lang="en-US" dirty="0"/>
-              <a:t> no </a:t>
-            </a:r>
-            <a:r>
-              <a:rPr lang="en-US" dirty="0" err="1"/>
-              <a:t>projeto</a:t>
-            </a:r>
-            <a:r>
-              <a:rPr lang="en-US" dirty="0"/>
-              <a:t>), </a:t>
-            </a:r>
-            <a:r>
-              <a:rPr lang="en-US" dirty="0" err="1"/>
-              <a:t>recomendo</a:t>
-            </a:r>
-            <a:r>
-              <a:rPr lang="en-US" dirty="0"/>
-              <a:t> </a:t>
-            </a:r>
-            <a:r>
-              <a:rPr lang="en-US" dirty="0" err="1"/>
-              <a:t>colocar</a:t>
-            </a:r>
-            <a:r>
-              <a:rPr lang="en-US" dirty="0"/>
-              <a:t> o </a:t>
-            </a:r>
-            <a:r>
-              <a:rPr lang="en-US" b="1" u="sng" dirty="0" err="1"/>
-              <a:t>nome</a:t>
-            </a:r>
-            <a:r>
-              <a:rPr lang="en-US" b="1" u="sng" dirty="0"/>
-              <a:t> de </a:t>
-            </a:r>
-            <a:r>
-              <a:rPr lang="en-US" b="1" u="sng" dirty="0" err="1"/>
-              <a:t>usuário</a:t>
-            </a:r>
-            <a:r>
-              <a:rPr lang="en-US" b="1" u="sng" dirty="0"/>
-              <a:t> e </a:t>
-            </a:r>
-            <a:r>
-              <a:rPr lang="en-US" b="1" u="sng" dirty="0" err="1"/>
-              <a:t>senha</a:t>
-            </a:r>
-            <a:r>
-              <a:rPr lang="en-US" b="1" u="sng" dirty="0"/>
-              <a:t> </a:t>
-            </a:r>
-            <a:r>
-              <a:rPr lang="en-US" b="1" u="sng" dirty="0" err="1"/>
-              <a:t>como</a:t>
-            </a:r>
-            <a:r>
-              <a:rPr lang="en-US" b="1" u="sng" dirty="0"/>
-              <a:t> “root”</a:t>
-            </a:r>
-            <a:r>
-              <a:rPr lang="en-US" dirty="0"/>
-              <a:t>.</a:t>
-            </a:r>
-          </a:p>
-          <a:p>
-            <a:endParaRPr lang="en-US" dirty="0"/>
-          </a:p>
-          <a:p>
-            <a:endParaRPr lang="pt-BR" dirty="0"/>
-          </a:p>
-        </p:txBody>
-      </p:sp>
+        </p:spPr>
+      </p:pic>
     </p:spTree>
     <p:extLst>
       <p:ext uri="{BB962C8B-B14F-4D97-AF65-F5344CB8AC3E}">
-        <p14:creationId xmlns:p14="http://schemas.microsoft.com/office/powerpoint/2010/main" val="3734812818"/>
+        <p14:creationId xmlns:p14="http://schemas.microsoft.com/office/powerpoint/2010/main" val="2124319770"/>
       </p:ext>
     </p:extLst>
   </p:cSld>
@@ -5652,7 +5564,7 @@
         <p:cNvPr id="1" name="">
           <a:extLst>
             <a:ext uri="{FF2B5EF4-FFF2-40B4-BE49-F238E27FC236}">
-              <a16:creationId xmlns:a16="http://schemas.microsoft.com/office/drawing/2014/main" id="{A9F73D6E-FC32-50DA-1CBC-9FDC465B155C}"/>
+              <a16:creationId xmlns:a16="http://schemas.microsoft.com/office/drawing/2014/main" id="{6CA8BECA-4C3C-99DF-E28B-6B3F90978087}"/>
             </a:ext>
           </a:extLst>
         </p:cNvPr>
@@ -5667,62 +5579,12 @@
           <a:chExt cx="0" cy="0"/>
         </a:xfrm>
       </p:grpSpPr>
-      <p:sp>
-        <p:nvSpPr>
-          <p:cNvPr id="2" name="Título 1">
-            <a:extLst>
-              <a:ext uri="{FF2B5EF4-FFF2-40B4-BE49-F238E27FC236}">
-                <a16:creationId xmlns:a16="http://schemas.microsoft.com/office/drawing/2014/main" id="{7D33F163-C736-9349-5711-22D353FEFD1A}"/>
-              </a:ext>
-            </a:extLst>
-          </p:cNvPr>
-          <p:cNvSpPr>
-            <a:spLocks noGrp="1"/>
-          </p:cNvSpPr>
-          <p:nvPr>
-            <p:ph type="title"/>
-          </p:nvPr>
-        </p:nvSpPr>
-        <p:spPr/>
-        <p:txBody>
-          <a:bodyPr/>
-          <a:lstStyle/>
-          <a:p>
-            <a:endParaRPr lang="pt-BR"/>
-          </a:p>
-        </p:txBody>
-      </p:sp>
-      <p:sp>
-        <p:nvSpPr>
-          <p:cNvPr id="3" name="Espaço Reservado para Conteúdo 2">
-            <a:extLst>
-              <a:ext uri="{FF2B5EF4-FFF2-40B4-BE49-F238E27FC236}">
-                <a16:creationId xmlns:a16="http://schemas.microsoft.com/office/drawing/2014/main" id="{13625611-E7FA-1D72-494A-0AFBC3CF9FB2}"/>
-              </a:ext>
-            </a:extLst>
-          </p:cNvPr>
-          <p:cNvSpPr>
-            <a:spLocks noGrp="1"/>
-          </p:cNvSpPr>
-          <p:nvPr>
-            <p:ph idx="1"/>
-          </p:nvPr>
-        </p:nvSpPr>
-        <p:spPr/>
-        <p:txBody>
-          <a:bodyPr/>
-          <a:lstStyle/>
-          <a:p>
-            <a:endParaRPr lang="pt-BR"/>
-          </a:p>
-        </p:txBody>
-      </p:sp>
       <p:pic>
         <p:nvPicPr>
-          <p:cNvPr id="4" name="Imagem 3">
-            <a:extLst>
-              <a:ext uri="{FF2B5EF4-FFF2-40B4-BE49-F238E27FC236}">
-                <a16:creationId xmlns:a16="http://schemas.microsoft.com/office/drawing/2014/main" id="{743371B3-3339-12F0-DD89-453EBF0A0ED8}"/>
+          <p:cNvPr id="5" name="Imagem 4">
+            <a:extLst>
+              <a:ext uri="{FF2B5EF4-FFF2-40B4-BE49-F238E27FC236}">
+                <a16:creationId xmlns:a16="http://schemas.microsoft.com/office/drawing/2014/main" id="{87CB8BAB-D6EB-CE4A-1CF1-B58D0C090EEA}"/>
               </a:ext>
             </a:extLst>
           </p:cNvPr>
@@ -5755,10 +5617,10 @@
       </p:pic>
       <p:sp>
         <p:nvSpPr>
-          <p:cNvPr id="5" name="CaixaDeTexto 4">
-            <a:extLst>
-              <a:ext uri="{FF2B5EF4-FFF2-40B4-BE49-F238E27FC236}">
-                <a16:creationId xmlns:a16="http://schemas.microsoft.com/office/drawing/2014/main" id="{C30338DA-9061-D8D4-B5A5-66A14A047FD4}"/>
+          <p:cNvPr id="2" name="CaixaDeTexto 1">
+            <a:extLst>
+              <a:ext uri="{FF2B5EF4-FFF2-40B4-BE49-F238E27FC236}">
+                <a16:creationId xmlns:a16="http://schemas.microsoft.com/office/drawing/2014/main" id="{DD962760-3318-0812-BCDC-A2440EDDB981}"/>
               </a:ext>
             </a:extLst>
           </p:cNvPr>
@@ -5767,8 +5629,8 @@
         </p:nvSpPr>
         <p:spPr>
           <a:xfrm>
-            <a:off x="3924300" y="2413337"/>
-            <a:ext cx="4343400" cy="1938992"/>
+            <a:off x="4410898" y="206292"/>
+            <a:ext cx="3370202" cy="646331"/>
           </a:xfrm>
           <a:prstGeom prst="rect">
             <a:avLst/>
@@ -5781,23 +5643,414 @@
           </a:bodyPr>
           <a:lstStyle/>
           <a:p>
-            <a:pPr algn="ctr"/>
-            <a:r>
-              <a:rPr lang="en-US" sz="6000" dirty="0">
+            <a:r>
+              <a:rPr lang="en-US" sz="3600" dirty="0" err="1"/>
+              <a:t>Relacionamentos</a:t>
+            </a:r>
+            <a:endParaRPr lang="pt-BR" sz="3600" dirty="0"/>
+          </a:p>
+        </p:txBody>
+      </p:sp>
+      <p:sp>
+        <p:nvSpPr>
+          <p:cNvPr id="6" name="Rectangle 1">
+            <a:extLst>
+              <a:ext uri="{FF2B5EF4-FFF2-40B4-BE49-F238E27FC236}">
+                <a16:creationId xmlns:a16="http://schemas.microsoft.com/office/drawing/2014/main" id="{13E55CD4-CA99-B00F-6B80-E3BE9FF4F0A5}"/>
+              </a:ext>
+            </a:extLst>
+          </p:cNvPr>
+          <p:cNvSpPr>
+            <a:spLocks noChangeArrowheads="1"/>
+          </p:cNvSpPr>
+          <p:nvPr/>
+        </p:nvSpPr>
+        <p:spPr bwMode="auto">
+          <a:xfrm>
+            <a:off x="196361" y="1058914"/>
+            <a:ext cx="11799277" cy="3416320"/>
+          </a:xfrm>
+          <a:prstGeom prst="rect">
+            <a:avLst/>
+          </a:prstGeom>
+          <a:noFill/>
+          <a:ln>
+            <a:noFill/>
+          </a:ln>
+          <a:effectLst/>
+          <a:extLst>
+            <a:ext uri="{909E8E84-426E-40DD-AFC4-6F175D3DCCD1}">
+              <a14:hiddenFill xmlns:a14="http://schemas.microsoft.com/office/drawing/2010/main">
                 <a:solidFill>
-                  <a:schemeClr val="accent5">
-                    <a:lumMod val="75000"/>
-                  </a:schemeClr>
+                  <a:schemeClr val="accent1"/>
                 </a:solidFill>
+              </a14:hiddenFill>
+            </a:ext>
+            <a:ext uri="{91240B29-F687-4F45-9708-019B960494DF}">
+              <a14:hiddenLine xmlns:a14="http://schemas.microsoft.com/office/drawing/2010/main" w="9525">
+                <a:solidFill>
+                  <a:schemeClr val="tx1"/>
+                </a:solidFill>
+                <a:miter lim="800000"/>
+                <a:headEnd/>
+                <a:tailEnd/>
+              </a14:hiddenLine>
+            </a:ext>
+            <a:ext uri="{AF507438-7753-43E0-B8FC-AC1667EBCBE1}">
+              <a14:hiddenEffects xmlns:a14="http://schemas.microsoft.com/office/drawing/2010/main">
+                <a:effectLst>
+                  <a:outerShdw dist="35921" dir="2700000" algn="ctr" rotWithShape="0">
+                    <a:schemeClr val="bg2"/>
+                  </a:outerShdw>
+                </a:effectLst>
+              </a14:hiddenEffects>
+            </a:ext>
+          </a:extLst>
+        </p:spPr>
+        <p:txBody>
+          <a:bodyPr vert="horz" wrap="square" lIns="91440" tIns="45720" rIns="91440" bIns="45720" numCol="1" anchor="ctr" anchorCtr="0" compatLnSpc="1">
+            <a:prstTxWarp prst="textNoShape">
+              <a:avLst/>
+            </a:prstTxWarp>
+            <a:spAutoFit/>
+          </a:bodyPr>
+          <a:lstStyle/>
+          <a:p>
+            <a:pPr marL="0" marR="0" lvl="0" indent="0" algn="l" defTabSz="914400" rtl="0" eaLnBrk="0" fontAlgn="base" latinLnBrk="0" hangingPunct="0">
+              <a:lnSpc>
+                <a:spcPct val="100000"/>
+              </a:lnSpc>
+              <a:spcBef>
+                <a:spcPct val="0"/>
+              </a:spcBef>
+              <a:spcAft>
+                <a:spcPct val="0"/>
+              </a:spcAft>
+              <a:buClrTx/>
+              <a:buSzTx/>
+              <a:buFontTx/>
+              <a:buNone/>
+              <a:tabLst/>
+            </a:pPr>
+            <a:r>
+              <a:rPr kumimoji="0" lang="pt-BR" altLang="pt-BR" sz="1800" b="1" i="0" u="none" strike="noStrike" cap="none" normalizeH="0" baseline="0" dirty="0">
+                <a:ln>
+                  <a:noFill/>
+                </a:ln>
+                <a:solidFill>
+                  <a:schemeClr val="tx1"/>
+                </a:solidFill>
+                <a:effectLst/>
+                <a:latin typeface="Arial" panose="020B0604020202020204" pitchFamily="34" charset="0"/>
               </a:rPr>
-              <a:t>AULA CONCLUÍDA!</a:t>
-            </a:r>
-            <a:endParaRPr lang="pt-BR" sz="6000" dirty="0">
+              <a:t>Conexões lógicas entre entidades</a:t>
+            </a:r>
+            <a:r>
+              <a:rPr kumimoji="0" lang="pt-BR" altLang="pt-BR" sz="1800" b="0" i="0" u="none" strike="noStrike" cap="none" normalizeH="0" baseline="0" dirty="0">
+                <a:ln>
+                  <a:noFill/>
+                </a:ln>
+                <a:solidFill>
+                  <a:schemeClr val="tx1"/>
+                </a:solidFill>
+                <a:effectLst/>
+                <a:latin typeface="Arial" panose="020B0604020202020204" pitchFamily="34" charset="0"/>
+              </a:rPr>
+              <a:t> que representam como os dados em diferentes tabelas estão associados uns aos outros.</a:t>
+            </a:r>
+          </a:p>
+          <a:p>
+            <a:pPr marL="0" marR="0" lvl="0" indent="0" algn="l" defTabSz="914400" rtl="0" eaLnBrk="0" fontAlgn="base" latinLnBrk="0" hangingPunct="0">
+              <a:lnSpc>
+                <a:spcPct val="100000"/>
+              </a:lnSpc>
+              <a:spcBef>
+                <a:spcPct val="0"/>
+              </a:spcBef>
+              <a:spcAft>
+                <a:spcPct val="0"/>
+              </a:spcAft>
+              <a:buClrTx/>
+              <a:buSzTx/>
+              <a:buFontTx/>
+              <a:buNone/>
+              <a:tabLst/>
+            </a:pPr>
+            <a:r>
+              <a:rPr kumimoji="0" lang="pt-BR" altLang="pt-BR" sz="1800" b="0" i="0" u="none" strike="noStrike" cap="none" normalizeH="0" baseline="0" dirty="0">
+                <a:ln>
+                  <a:noFill/>
+                </a:ln>
+                <a:solidFill>
+                  <a:schemeClr val="tx1"/>
+                </a:solidFill>
+                <a:effectLst/>
+                <a:latin typeface="Arial" panose="020B0604020202020204" pitchFamily="34" charset="0"/>
+              </a:rPr>
+              <a:t>No modelo relacional, </a:t>
+            </a:r>
+            <a:r>
+              <a:rPr kumimoji="0" lang="pt-BR" altLang="pt-BR" sz="1800" b="1" i="0" u="none" strike="noStrike" cap="none" normalizeH="0" baseline="0" dirty="0">
+                <a:ln>
+                  <a:noFill/>
+                </a:ln>
+                <a:solidFill>
+                  <a:schemeClr val="tx1"/>
+                </a:solidFill>
+                <a:effectLst/>
+                <a:latin typeface="Arial" panose="020B0604020202020204" pitchFamily="34" charset="0"/>
+              </a:rPr>
+              <a:t>relacionamentos</a:t>
+            </a:r>
+            <a:r>
+              <a:rPr kumimoji="0" lang="pt-BR" altLang="pt-BR" sz="1800" b="0" i="0" u="none" strike="noStrike" cap="none" normalizeH="0" baseline="0" dirty="0">
+                <a:ln>
+                  <a:noFill/>
+                </a:ln>
+                <a:solidFill>
+                  <a:schemeClr val="tx1"/>
+                </a:solidFill>
+                <a:effectLst/>
+                <a:latin typeface="Arial" panose="020B0604020202020204" pitchFamily="34" charset="0"/>
+              </a:rPr>
+              <a:t> ajudam a manter a </a:t>
+            </a:r>
+            <a:r>
+              <a:rPr kumimoji="0" lang="pt-BR" altLang="pt-BR" sz="1800" b="1" i="0" u="none" strike="noStrike" cap="none" normalizeH="0" baseline="0" dirty="0">
+                <a:ln>
+                  <a:noFill/>
+                </a:ln>
+                <a:solidFill>
+                  <a:schemeClr val="tx1"/>
+                </a:solidFill>
+                <a:effectLst/>
+                <a:latin typeface="Arial" panose="020B0604020202020204" pitchFamily="34" charset="0"/>
+              </a:rPr>
+              <a:t>integridade referencial</a:t>
+            </a:r>
+            <a:r>
+              <a:rPr kumimoji="0" lang="pt-BR" altLang="pt-BR" sz="1800" b="0" i="0" u="none" strike="noStrike" cap="none" normalizeH="0" baseline="0" dirty="0">
+                <a:ln>
+                  <a:noFill/>
+                </a:ln>
+                <a:solidFill>
+                  <a:schemeClr val="tx1"/>
+                </a:solidFill>
+                <a:effectLst/>
+                <a:latin typeface="Arial" panose="020B0604020202020204" pitchFamily="34" charset="0"/>
+              </a:rPr>
+              <a:t>, evitando dados duplicados e inconsistentes.</a:t>
+            </a:r>
+          </a:p>
+          <a:p>
+            <a:pPr marL="0" marR="0" lvl="0" indent="0" algn="l" defTabSz="914400" rtl="0" eaLnBrk="0" fontAlgn="base" latinLnBrk="0" hangingPunct="0">
+              <a:lnSpc>
+                <a:spcPct val="100000"/>
+              </a:lnSpc>
+              <a:spcBef>
+                <a:spcPct val="0"/>
+              </a:spcBef>
+              <a:spcAft>
+                <a:spcPct val="0"/>
+              </a:spcAft>
+              <a:buClrTx/>
+              <a:buSzTx/>
+              <a:buFontTx/>
+              <a:buNone/>
+              <a:tabLst/>
+            </a:pPr>
+            <a:endParaRPr lang="pt-BR" altLang="pt-BR" dirty="0">
+              <a:latin typeface="Arial" panose="020B0604020202020204" pitchFamily="34" charset="0"/>
+            </a:endParaRPr>
+          </a:p>
+          <a:p>
+            <a:pPr marL="0" marR="0" lvl="0" indent="0" algn="l" defTabSz="914400" rtl="0" eaLnBrk="0" fontAlgn="base" latinLnBrk="0" hangingPunct="0">
+              <a:lnSpc>
+                <a:spcPct val="100000"/>
+              </a:lnSpc>
+              <a:spcBef>
+                <a:spcPct val="0"/>
+              </a:spcBef>
+              <a:spcAft>
+                <a:spcPct val="0"/>
+              </a:spcAft>
+              <a:buClrTx/>
+              <a:buSzTx/>
+              <a:buFontTx/>
+              <a:buNone/>
+              <a:tabLst/>
+            </a:pPr>
+            <a:r>
+              <a:rPr kumimoji="0" lang="pt-BR" altLang="pt-BR" sz="1800" b="0" i="0" u="none" strike="noStrike" cap="none" normalizeH="0" baseline="0" dirty="0">
+                <a:ln>
+                  <a:noFill/>
+                </a:ln>
+                <a:solidFill>
+                  <a:schemeClr val="tx1"/>
+                </a:solidFill>
+                <a:effectLst/>
+                <a:latin typeface="Arial" panose="020B0604020202020204" pitchFamily="34" charset="0"/>
+              </a:rPr>
+              <a:t>Classificação:</a:t>
+            </a:r>
+          </a:p>
+          <a:p>
+            <a:pPr marL="0" marR="0" lvl="0" indent="0" algn="l" defTabSz="914400" rtl="0" eaLnBrk="0" fontAlgn="base" latinLnBrk="0" hangingPunct="0">
+              <a:lnSpc>
+                <a:spcPct val="100000"/>
+              </a:lnSpc>
+              <a:spcBef>
+                <a:spcPct val="0"/>
+              </a:spcBef>
+              <a:spcAft>
+                <a:spcPct val="0"/>
+              </a:spcAft>
+              <a:buClrTx/>
+              <a:buSzTx/>
+              <a:buFontTx/>
+              <a:buNone/>
+              <a:tabLst/>
+            </a:pPr>
+            <a:endParaRPr lang="pt-BR" altLang="pt-BR" dirty="0">
+              <a:latin typeface="Arial" panose="020B0604020202020204" pitchFamily="34" charset="0"/>
+            </a:endParaRPr>
+          </a:p>
+          <a:p>
+            <a:pPr marL="285750" marR="0" lvl="0" indent="-285750" algn="l" defTabSz="914400" rtl="0" eaLnBrk="0" fontAlgn="base" latinLnBrk="0" hangingPunct="0">
+              <a:lnSpc>
+                <a:spcPct val="100000"/>
+              </a:lnSpc>
+              <a:spcBef>
+                <a:spcPct val="0"/>
+              </a:spcBef>
+              <a:spcAft>
+                <a:spcPct val="0"/>
+              </a:spcAft>
+              <a:buClrTx/>
+              <a:buSzTx/>
+              <a:buFont typeface="Wingdings" panose="05000000000000000000" pitchFamily="2" charset="2"/>
+              <a:buChar char="Ø"/>
+              <a:tabLst/>
+            </a:pPr>
+            <a:r>
+              <a:rPr lang="pt-BR" altLang="pt-BR" dirty="0">
+                <a:latin typeface="Arial" panose="020B0604020202020204" pitchFamily="34" charset="0"/>
+              </a:rPr>
+              <a:t>1:1</a:t>
+            </a:r>
+          </a:p>
+          <a:p>
+            <a:pPr marL="285750" marR="0" lvl="0" indent="-285750" algn="l" defTabSz="914400" rtl="0" eaLnBrk="0" fontAlgn="base" latinLnBrk="0" hangingPunct="0">
+              <a:lnSpc>
+                <a:spcPct val="100000"/>
+              </a:lnSpc>
+              <a:spcBef>
+                <a:spcPct val="0"/>
+              </a:spcBef>
+              <a:spcAft>
+                <a:spcPct val="0"/>
+              </a:spcAft>
+              <a:buClrTx/>
+              <a:buSzTx/>
+              <a:buFont typeface="Wingdings" panose="05000000000000000000" pitchFamily="2" charset="2"/>
+              <a:buChar char="Ø"/>
+              <a:tabLst/>
+            </a:pPr>
+            <a:r>
+              <a:rPr kumimoji="0" lang="pt-BR" altLang="pt-BR" sz="1800" b="0" i="0" u="none" strike="noStrike" cap="none" normalizeH="0" baseline="0" dirty="0">
+                <a:ln>
+                  <a:noFill/>
+                </a:ln>
+                <a:solidFill>
+                  <a:schemeClr val="tx1"/>
+                </a:solidFill>
+                <a:effectLst/>
+                <a:latin typeface="Arial" panose="020B0604020202020204" pitchFamily="34" charset="0"/>
+              </a:rPr>
+              <a:t>1:N</a:t>
+            </a:r>
+          </a:p>
+          <a:p>
+            <a:pPr marL="285750" marR="0" lvl="0" indent="-285750" algn="l" defTabSz="914400" rtl="0" eaLnBrk="0" fontAlgn="base" latinLnBrk="0" hangingPunct="0">
+              <a:lnSpc>
+                <a:spcPct val="100000"/>
+              </a:lnSpc>
+              <a:spcBef>
+                <a:spcPct val="0"/>
+              </a:spcBef>
+              <a:spcAft>
+                <a:spcPct val="0"/>
+              </a:spcAft>
+              <a:buClrTx/>
+              <a:buSzTx/>
+              <a:buFont typeface="Wingdings" panose="05000000000000000000" pitchFamily="2" charset="2"/>
+              <a:buChar char="Ø"/>
+              <a:tabLst/>
+            </a:pPr>
+            <a:r>
+              <a:rPr lang="pt-BR" altLang="pt-BR" dirty="0">
+                <a:latin typeface="Arial" panose="020B0604020202020204" pitchFamily="34" charset="0"/>
+              </a:rPr>
+              <a:t>N:M</a:t>
+            </a:r>
+            <a:endParaRPr kumimoji="0" lang="pt-BR" altLang="pt-BR" sz="1800" b="0" i="0" u="none" strike="noStrike" cap="none" normalizeH="0" baseline="0" dirty="0">
+              <a:ln>
+                <a:noFill/>
+              </a:ln>
               <a:solidFill>
-                <a:schemeClr val="accent5">
-                  <a:lumMod val="75000"/>
-                </a:schemeClr>
+                <a:schemeClr val="tx1"/>
               </a:solidFill>
+              <a:effectLst/>
+              <a:latin typeface="Arial" panose="020B0604020202020204" pitchFamily="34" charset="0"/>
+            </a:endParaRPr>
+          </a:p>
+          <a:p>
+            <a:pPr marL="0" marR="0" lvl="0" indent="0" algn="l" defTabSz="914400" rtl="0" eaLnBrk="0" fontAlgn="base" latinLnBrk="0" hangingPunct="0">
+              <a:lnSpc>
+                <a:spcPct val="100000"/>
+              </a:lnSpc>
+              <a:spcBef>
+                <a:spcPct val="0"/>
+              </a:spcBef>
+              <a:spcAft>
+                <a:spcPct val="0"/>
+              </a:spcAft>
+              <a:buClrTx/>
+              <a:buSzTx/>
+              <a:buFontTx/>
+              <a:buNone/>
+              <a:tabLst/>
+            </a:pPr>
+            <a:endParaRPr lang="pt-BR" altLang="pt-BR" dirty="0">
+              <a:latin typeface="Arial" panose="020B0604020202020204" pitchFamily="34" charset="0"/>
+            </a:endParaRPr>
+          </a:p>
+          <a:p>
+            <a:pPr marL="0" marR="0" lvl="0" indent="0" algn="l" defTabSz="914400" rtl="0" eaLnBrk="0" fontAlgn="base" latinLnBrk="0" hangingPunct="0">
+              <a:lnSpc>
+                <a:spcPct val="100000"/>
+              </a:lnSpc>
+              <a:spcBef>
+                <a:spcPct val="0"/>
+              </a:spcBef>
+              <a:spcAft>
+                <a:spcPct val="0"/>
+              </a:spcAft>
+              <a:buClrTx/>
+              <a:buSzTx/>
+              <a:buFontTx/>
+              <a:buNone/>
+              <a:tabLst/>
+            </a:pPr>
+            <a:endParaRPr kumimoji="0" lang="pt-BR" altLang="pt-BR" sz="1800" b="0" i="0" u="none" strike="noStrike" cap="none" normalizeH="0" baseline="0" dirty="0">
+              <a:ln>
+                <a:noFill/>
+              </a:ln>
+              <a:solidFill>
+                <a:schemeClr val="tx1"/>
+              </a:solidFill>
+              <a:effectLst/>
+              <a:latin typeface="Arial" panose="020B0604020202020204" pitchFamily="34" charset="0"/>
             </a:endParaRPr>
           </a:p>
         </p:txBody>
@@ -5805,7 +6058,805 @@
     </p:spTree>
     <p:extLst>
       <p:ext uri="{BB962C8B-B14F-4D97-AF65-F5344CB8AC3E}">
-        <p14:creationId xmlns:p14="http://schemas.microsoft.com/office/powerpoint/2010/main" val="3532846639"/>
+        <p14:creationId xmlns:p14="http://schemas.microsoft.com/office/powerpoint/2010/main" val="889678389"/>
+      </p:ext>
+    </p:extLst>
+  </p:cSld>
+  <p:clrMapOvr>
+    <a:masterClrMapping/>
+  </p:clrMapOvr>
+</p:sld>
+</file>
+
+<file path=ppt/slides/slide8.xml><?xml version="1.0" encoding="utf-8"?>
+<p:sld xmlns:a="http://schemas.openxmlformats.org/drawingml/2006/main" xmlns:r="http://schemas.openxmlformats.org/officeDocument/2006/relationships" xmlns:p="http://schemas.openxmlformats.org/presentationml/2006/main">
+  <p:cSld>
+    <p:spTree>
+      <p:nvGrpSpPr>
+        <p:cNvPr id="1" name="">
+          <a:extLst>
+            <a:ext uri="{FF2B5EF4-FFF2-40B4-BE49-F238E27FC236}">
+              <a16:creationId xmlns:a16="http://schemas.microsoft.com/office/drawing/2014/main" id="{EF486754-F893-FFE8-C9AC-BF152A1D27E6}"/>
+            </a:ext>
+          </a:extLst>
+        </p:cNvPr>
+        <p:cNvGrpSpPr/>
+        <p:nvPr/>
+      </p:nvGrpSpPr>
+      <p:grpSpPr>
+        <a:xfrm>
+          <a:off x="0" y="0"/>
+          <a:ext cx="0" cy="0"/>
+          <a:chOff x="0" y="0"/>
+          <a:chExt cx="0" cy="0"/>
+        </a:xfrm>
+      </p:grpSpPr>
+      <p:pic>
+        <p:nvPicPr>
+          <p:cNvPr id="5" name="Imagem 4">
+            <a:extLst>
+              <a:ext uri="{FF2B5EF4-FFF2-40B4-BE49-F238E27FC236}">
+                <a16:creationId xmlns:a16="http://schemas.microsoft.com/office/drawing/2014/main" id="{7CDF19D8-D023-97C1-C351-BB13D9D6ACF5}"/>
+              </a:ext>
+            </a:extLst>
+          </p:cNvPr>
+          <p:cNvPicPr>
+            <a:picLocks noChangeAspect="1"/>
+          </p:cNvPicPr>
+          <p:nvPr/>
+        </p:nvPicPr>
+        <p:blipFill>
+          <a:blip r:embed="rId2">
+            <a:extLst>
+              <a:ext uri="{28A0092B-C50C-407E-A947-70E740481C1C}">
+                <a14:useLocalDpi xmlns:a14="http://schemas.microsoft.com/office/drawing/2010/main" val="0"/>
+              </a:ext>
+            </a:extLst>
+          </a:blip>
+          <a:stretch>
+            <a:fillRect/>
+          </a:stretch>
+        </p:blipFill>
+        <p:spPr>
+          <a:xfrm>
+            <a:off x="0" y="0"/>
+            <a:ext cx="12192000" cy="6858000"/>
+          </a:xfrm>
+          <a:prstGeom prst="rect">
+            <a:avLst/>
+          </a:prstGeom>
+        </p:spPr>
+      </p:pic>
+      <p:sp>
+        <p:nvSpPr>
+          <p:cNvPr id="2" name="CaixaDeTexto 1">
+            <a:extLst>
+              <a:ext uri="{FF2B5EF4-FFF2-40B4-BE49-F238E27FC236}">
+                <a16:creationId xmlns:a16="http://schemas.microsoft.com/office/drawing/2014/main" id="{0560B9EA-699B-2624-3A61-689A6CE7E79F}"/>
+              </a:ext>
+            </a:extLst>
+          </p:cNvPr>
+          <p:cNvSpPr txBox="1"/>
+          <p:nvPr/>
+        </p:nvSpPr>
+        <p:spPr>
+          <a:xfrm>
+            <a:off x="4384453" y="259181"/>
+            <a:ext cx="3423093" cy="646331"/>
+          </a:xfrm>
+          <a:prstGeom prst="rect">
+            <a:avLst/>
+          </a:prstGeom>
+          <a:noFill/>
+        </p:spPr>
+        <p:txBody>
+          <a:bodyPr wrap="square" rtlCol="0">
+            <a:spAutoFit/>
+          </a:bodyPr>
+          <a:lstStyle/>
+          <a:p>
+            <a:r>
+              <a:rPr lang="en-US" sz="3600" dirty="0" err="1"/>
+              <a:t>Relacionamentos</a:t>
+            </a:r>
+            <a:endParaRPr lang="pt-BR" sz="3600" dirty="0"/>
+          </a:p>
+        </p:txBody>
+      </p:sp>
+      <p:sp>
+        <p:nvSpPr>
+          <p:cNvPr id="11" name="CaixaDeTexto 10">
+            <a:extLst>
+              <a:ext uri="{FF2B5EF4-FFF2-40B4-BE49-F238E27FC236}">
+                <a16:creationId xmlns:a16="http://schemas.microsoft.com/office/drawing/2014/main" id="{EBDEA277-FB7F-1599-9D6E-A8ADDBE481DB}"/>
+              </a:ext>
+            </a:extLst>
+          </p:cNvPr>
+          <p:cNvSpPr txBox="1"/>
+          <p:nvPr/>
+        </p:nvSpPr>
+        <p:spPr>
+          <a:xfrm>
+            <a:off x="1501553" y="1933659"/>
+            <a:ext cx="9365737" cy="923330"/>
+          </a:xfrm>
+          <a:prstGeom prst="rect">
+            <a:avLst/>
+          </a:prstGeom>
+          <a:noFill/>
+        </p:spPr>
+        <p:txBody>
+          <a:bodyPr wrap="square" rtlCol="0">
+            <a:spAutoFit/>
+          </a:bodyPr>
+          <a:lstStyle/>
+          <a:p>
+            <a:r>
+              <a:rPr lang="pt-BR" dirty="0"/>
+              <a:t>Esse tipo de relacionamento é menos comum, mas útil quando há a necessidade de </a:t>
+            </a:r>
+            <a:r>
+              <a:rPr lang="pt-BR" b="1" dirty="0"/>
+              <a:t>separar dados sensíveis</a:t>
+            </a:r>
+            <a:r>
+              <a:rPr lang="pt-BR" dirty="0"/>
+              <a:t> ou dividir lógicas distintas. Por exemplo, em um sistema de RH, cada funcionário pode ter um único registro de pagamento.</a:t>
+            </a:r>
+            <a:endParaRPr lang="pt-BR" sz="2000" dirty="0"/>
+          </a:p>
+        </p:txBody>
+      </p:sp>
+      <p:sp>
+        <p:nvSpPr>
+          <p:cNvPr id="12" name="CaixaDeTexto 11">
+            <a:extLst>
+              <a:ext uri="{FF2B5EF4-FFF2-40B4-BE49-F238E27FC236}">
+                <a16:creationId xmlns:a16="http://schemas.microsoft.com/office/drawing/2014/main" id="{C5B9BC37-7543-7A56-6CF1-FF6B73B33410}"/>
+              </a:ext>
+            </a:extLst>
+          </p:cNvPr>
+          <p:cNvSpPr txBox="1"/>
+          <p:nvPr/>
+        </p:nvSpPr>
+        <p:spPr>
+          <a:xfrm>
+            <a:off x="4967018" y="4088921"/>
+            <a:ext cx="360485" cy="369332"/>
+          </a:xfrm>
+          <a:prstGeom prst="rect">
+            <a:avLst/>
+          </a:prstGeom>
+          <a:noFill/>
+        </p:spPr>
+        <p:txBody>
+          <a:bodyPr wrap="square" rtlCol="0">
+            <a:spAutoFit/>
+          </a:bodyPr>
+          <a:lstStyle/>
+          <a:p>
+            <a:endParaRPr lang="pt-BR" dirty="0"/>
+          </a:p>
+        </p:txBody>
+      </p:sp>
+      <p:sp>
+        <p:nvSpPr>
+          <p:cNvPr id="13" name="CaixaDeTexto 12">
+            <a:extLst>
+              <a:ext uri="{FF2B5EF4-FFF2-40B4-BE49-F238E27FC236}">
+                <a16:creationId xmlns:a16="http://schemas.microsoft.com/office/drawing/2014/main" id="{93974DFA-F905-D069-B6FF-32170BA0CC24}"/>
+              </a:ext>
+            </a:extLst>
+          </p:cNvPr>
+          <p:cNvSpPr txBox="1"/>
+          <p:nvPr/>
+        </p:nvSpPr>
+        <p:spPr>
+          <a:xfrm>
+            <a:off x="6507213" y="4522674"/>
+            <a:ext cx="360485" cy="369332"/>
+          </a:xfrm>
+          <a:prstGeom prst="rect">
+            <a:avLst/>
+          </a:prstGeom>
+          <a:noFill/>
+        </p:spPr>
+        <p:txBody>
+          <a:bodyPr wrap="square" rtlCol="0">
+            <a:spAutoFit/>
+          </a:bodyPr>
+          <a:lstStyle/>
+          <a:p>
+            <a:endParaRPr lang="pt-BR" dirty="0"/>
+          </a:p>
+        </p:txBody>
+      </p:sp>
+      <p:sp>
+        <p:nvSpPr>
+          <p:cNvPr id="6" name="CaixaDeTexto 5">
+            <a:extLst>
+              <a:ext uri="{FF2B5EF4-FFF2-40B4-BE49-F238E27FC236}">
+                <a16:creationId xmlns:a16="http://schemas.microsoft.com/office/drawing/2014/main" id="{8C780A52-69E7-7408-2610-3969B90C49CD}"/>
+              </a:ext>
+            </a:extLst>
+          </p:cNvPr>
+          <p:cNvSpPr txBox="1"/>
+          <p:nvPr/>
+        </p:nvSpPr>
+        <p:spPr>
+          <a:xfrm>
+            <a:off x="1501553" y="3433161"/>
+            <a:ext cx="9365736" cy="923330"/>
+          </a:xfrm>
+          <a:prstGeom prst="rect">
+            <a:avLst/>
+          </a:prstGeom>
+          <a:noFill/>
+        </p:spPr>
+        <p:txBody>
+          <a:bodyPr wrap="square">
+            <a:spAutoFit/>
+          </a:bodyPr>
+          <a:lstStyle/>
+          <a:p>
+            <a:r>
+              <a:rPr lang="pt-BR" dirty="0"/>
+              <a:t>É o tipo mais frequente de relacionamento em bancos de dados. Imagine um cliente que faz vários pedidos: temos uma relação </a:t>
+            </a:r>
+            <a:r>
+              <a:rPr lang="pt-BR" b="1" dirty="0"/>
+              <a:t>1 cliente → N pedidos</a:t>
+            </a:r>
+            <a:r>
+              <a:rPr lang="pt-BR" dirty="0"/>
+              <a:t>. Isso permite organizar o sistema de forma escalável, mantendo os dados centralizados e fáceis de acessar.</a:t>
+            </a:r>
+          </a:p>
+        </p:txBody>
+      </p:sp>
+      <p:sp>
+        <p:nvSpPr>
+          <p:cNvPr id="10" name="CaixaDeTexto 9">
+            <a:extLst>
+              <a:ext uri="{FF2B5EF4-FFF2-40B4-BE49-F238E27FC236}">
+                <a16:creationId xmlns:a16="http://schemas.microsoft.com/office/drawing/2014/main" id="{E6009464-39C9-3303-5C0B-B709ECD7FA42}"/>
+              </a:ext>
+            </a:extLst>
+          </p:cNvPr>
+          <p:cNvSpPr txBox="1"/>
+          <p:nvPr/>
+        </p:nvSpPr>
+        <p:spPr>
+          <a:xfrm>
+            <a:off x="1501554" y="4915315"/>
+            <a:ext cx="9365735" cy="923330"/>
+          </a:xfrm>
+          <a:prstGeom prst="rect">
+            <a:avLst/>
+          </a:prstGeom>
+          <a:noFill/>
+        </p:spPr>
+        <p:txBody>
+          <a:bodyPr wrap="square">
+            <a:spAutoFit/>
+          </a:bodyPr>
+          <a:lstStyle/>
+          <a:p>
+            <a:r>
+              <a:rPr lang="pt-BR" dirty="0"/>
+              <a:t>Esse relacionamento ocorre quando várias instâncias de uma entidade se relacionam com várias instâncias de outra. Como não é possível representar isso diretamente em bancos relacionais, utilizamos </a:t>
+            </a:r>
+            <a:r>
+              <a:rPr lang="pt-BR" b="1" dirty="0"/>
+              <a:t>tabelas associativas</a:t>
+            </a:r>
+            <a:r>
+              <a:rPr lang="pt-BR" dirty="0"/>
+              <a:t> para intermediar a conexão.</a:t>
+            </a:r>
+          </a:p>
+        </p:txBody>
+      </p:sp>
+      <p:sp>
+        <p:nvSpPr>
+          <p:cNvPr id="14" name="CaixaDeTexto 13">
+            <a:extLst>
+              <a:ext uri="{FF2B5EF4-FFF2-40B4-BE49-F238E27FC236}">
+                <a16:creationId xmlns:a16="http://schemas.microsoft.com/office/drawing/2014/main" id="{3BE60FD6-3EC8-1F45-1207-4C1754EDAB36}"/>
+              </a:ext>
+            </a:extLst>
+          </p:cNvPr>
+          <p:cNvSpPr txBox="1"/>
+          <p:nvPr/>
+        </p:nvSpPr>
+        <p:spPr>
+          <a:xfrm>
+            <a:off x="1501553" y="1471994"/>
+            <a:ext cx="3035278" cy="461665"/>
+          </a:xfrm>
+          <a:prstGeom prst="rect">
+            <a:avLst/>
+          </a:prstGeom>
+          <a:noFill/>
+        </p:spPr>
+        <p:txBody>
+          <a:bodyPr wrap="square" rtlCol="0">
+            <a:spAutoFit/>
+          </a:bodyPr>
+          <a:lstStyle/>
+          <a:p>
+            <a:pPr marL="342900" indent="-342900">
+              <a:buFont typeface="Wingdings" panose="05000000000000000000" pitchFamily="2" charset="2"/>
+              <a:buChar char="v"/>
+            </a:pPr>
+            <a:r>
+              <a:rPr lang="en-US" sz="2400" u="sng" dirty="0" err="1"/>
+              <a:t>Relacionamento</a:t>
+            </a:r>
+            <a:r>
+              <a:rPr lang="en-US" sz="2400" u="sng" dirty="0"/>
+              <a:t> 1:1</a:t>
+            </a:r>
+            <a:endParaRPr lang="pt-BR" sz="2400" u="sng" dirty="0"/>
+          </a:p>
+        </p:txBody>
+      </p:sp>
+      <p:sp>
+        <p:nvSpPr>
+          <p:cNvPr id="15" name="CaixaDeTexto 14">
+            <a:extLst>
+              <a:ext uri="{FF2B5EF4-FFF2-40B4-BE49-F238E27FC236}">
+                <a16:creationId xmlns:a16="http://schemas.microsoft.com/office/drawing/2014/main" id="{C452D7D9-E423-D10D-4B90-2420080A304B}"/>
+              </a:ext>
+            </a:extLst>
+          </p:cNvPr>
+          <p:cNvSpPr txBox="1"/>
+          <p:nvPr/>
+        </p:nvSpPr>
+        <p:spPr>
+          <a:xfrm>
+            <a:off x="1501553" y="3023172"/>
+            <a:ext cx="3035278" cy="461665"/>
+          </a:xfrm>
+          <a:prstGeom prst="rect">
+            <a:avLst/>
+          </a:prstGeom>
+          <a:noFill/>
+        </p:spPr>
+        <p:txBody>
+          <a:bodyPr wrap="square" rtlCol="0">
+            <a:spAutoFit/>
+          </a:bodyPr>
+          <a:lstStyle/>
+          <a:p>
+            <a:pPr marL="342900" indent="-342900">
+              <a:buFont typeface="Wingdings" panose="05000000000000000000" pitchFamily="2" charset="2"/>
+              <a:buChar char="v"/>
+            </a:pPr>
+            <a:r>
+              <a:rPr lang="en-US" sz="2400" u="sng" dirty="0" err="1"/>
+              <a:t>Relacionamento</a:t>
+            </a:r>
+            <a:r>
+              <a:rPr lang="en-US" sz="2400" u="sng" dirty="0"/>
+              <a:t> 1:N</a:t>
+            </a:r>
+            <a:endParaRPr lang="pt-BR" sz="2400" u="sng" dirty="0"/>
+          </a:p>
+        </p:txBody>
+      </p:sp>
+      <p:sp>
+        <p:nvSpPr>
+          <p:cNvPr id="16" name="CaixaDeTexto 15">
+            <a:extLst>
+              <a:ext uri="{FF2B5EF4-FFF2-40B4-BE49-F238E27FC236}">
+                <a16:creationId xmlns:a16="http://schemas.microsoft.com/office/drawing/2014/main" id="{CF2E11E0-70E1-0BED-870C-87B5415F33FF}"/>
+              </a:ext>
+            </a:extLst>
+          </p:cNvPr>
+          <p:cNvSpPr txBox="1"/>
+          <p:nvPr/>
+        </p:nvSpPr>
+        <p:spPr>
+          <a:xfrm>
+            <a:off x="1501553" y="4494762"/>
+            <a:ext cx="3149577" cy="461665"/>
+          </a:xfrm>
+          <a:prstGeom prst="rect">
+            <a:avLst/>
+          </a:prstGeom>
+          <a:noFill/>
+        </p:spPr>
+        <p:txBody>
+          <a:bodyPr wrap="square" rtlCol="0">
+            <a:spAutoFit/>
+          </a:bodyPr>
+          <a:lstStyle/>
+          <a:p>
+            <a:pPr marL="342900" indent="-342900">
+              <a:buFont typeface="Wingdings" panose="05000000000000000000" pitchFamily="2" charset="2"/>
+              <a:buChar char="v"/>
+            </a:pPr>
+            <a:r>
+              <a:rPr lang="en-US" sz="2400" u="sng" dirty="0" err="1"/>
+              <a:t>Relacionamento</a:t>
+            </a:r>
+            <a:r>
+              <a:rPr lang="en-US" sz="2400" u="sng" dirty="0"/>
+              <a:t> N:M</a:t>
+            </a:r>
+            <a:endParaRPr lang="pt-BR" sz="2400" u="sng" dirty="0"/>
+          </a:p>
+        </p:txBody>
+      </p:sp>
+    </p:spTree>
+    <p:extLst>
+      <p:ext uri="{BB962C8B-B14F-4D97-AF65-F5344CB8AC3E}">
+        <p14:creationId xmlns:p14="http://schemas.microsoft.com/office/powerpoint/2010/main" val="395381269"/>
+      </p:ext>
+    </p:extLst>
+  </p:cSld>
+  <p:clrMapOvr>
+    <a:masterClrMapping/>
+  </p:clrMapOvr>
+</p:sld>
+</file>
+
+<file path=ppt/slides/slide9.xml><?xml version="1.0" encoding="utf-8"?>
+<p:sld xmlns:a="http://schemas.openxmlformats.org/drawingml/2006/main" xmlns:r="http://schemas.openxmlformats.org/officeDocument/2006/relationships" xmlns:p="http://schemas.openxmlformats.org/presentationml/2006/main">
+  <p:cSld>
+    <p:spTree>
+      <p:nvGrpSpPr>
+        <p:cNvPr id="1" name="">
+          <a:extLst>
+            <a:ext uri="{FF2B5EF4-FFF2-40B4-BE49-F238E27FC236}">
+              <a16:creationId xmlns:a16="http://schemas.microsoft.com/office/drawing/2014/main" id="{5E8A27A6-8EF8-12D8-8FD8-D7F39147A30A}"/>
+            </a:ext>
+          </a:extLst>
+        </p:cNvPr>
+        <p:cNvGrpSpPr/>
+        <p:nvPr/>
+      </p:nvGrpSpPr>
+      <p:grpSpPr>
+        <a:xfrm>
+          <a:off x="0" y="0"/>
+          <a:ext cx="0" cy="0"/>
+          <a:chOff x="0" y="0"/>
+          <a:chExt cx="0" cy="0"/>
+        </a:xfrm>
+      </p:grpSpPr>
+      <p:sp>
+        <p:nvSpPr>
+          <p:cNvPr id="2" name="Título 1">
+            <a:extLst>
+              <a:ext uri="{FF2B5EF4-FFF2-40B4-BE49-F238E27FC236}">
+                <a16:creationId xmlns:a16="http://schemas.microsoft.com/office/drawing/2014/main" id="{6BF18DC9-5815-0212-B6E0-D8C10E6A492B}"/>
+              </a:ext>
+            </a:extLst>
+          </p:cNvPr>
+          <p:cNvSpPr>
+            <a:spLocks noGrp="1"/>
+          </p:cNvSpPr>
+          <p:nvPr>
+            <p:ph type="title"/>
+          </p:nvPr>
+        </p:nvSpPr>
+        <p:spPr/>
+        <p:txBody>
+          <a:bodyPr/>
+          <a:lstStyle/>
+          <a:p>
+            <a:endParaRPr lang="pt-BR"/>
+          </a:p>
+        </p:txBody>
+      </p:sp>
+      <p:sp>
+        <p:nvSpPr>
+          <p:cNvPr id="3" name="Espaço Reservado para Conteúdo 2">
+            <a:extLst>
+              <a:ext uri="{FF2B5EF4-FFF2-40B4-BE49-F238E27FC236}">
+                <a16:creationId xmlns:a16="http://schemas.microsoft.com/office/drawing/2014/main" id="{4A8E3B4E-2F8A-3689-618B-A91B245EFDE0}"/>
+              </a:ext>
+            </a:extLst>
+          </p:cNvPr>
+          <p:cNvSpPr>
+            <a:spLocks noGrp="1"/>
+          </p:cNvSpPr>
+          <p:nvPr>
+            <p:ph idx="1"/>
+          </p:nvPr>
+        </p:nvSpPr>
+        <p:spPr/>
+        <p:txBody>
+          <a:bodyPr/>
+          <a:lstStyle/>
+          <a:p>
+            <a:endParaRPr lang="pt-BR"/>
+          </a:p>
+        </p:txBody>
+      </p:sp>
+      <p:pic>
+        <p:nvPicPr>
+          <p:cNvPr id="4" name="Imagem 3">
+            <a:extLst>
+              <a:ext uri="{FF2B5EF4-FFF2-40B4-BE49-F238E27FC236}">
+                <a16:creationId xmlns:a16="http://schemas.microsoft.com/office/drawing/2014/main" id="{81421DD0-6686-3CBC-6B71-56FD159EB670}"/>
+              </a:ext>
+            </a:extLst>
+          </p:cNvPr>
+          <p:cNvPicPr>
+            <a:picLocks noChangeAspect="1"/>
+          </p:cNvPicPr>
+          <p:nvPr/>
+        </p:nvPicPr>
+        <p:blipFill>
+          <a:blip r:embed="rId2">
+            <a:extLst>
+              <a:ext uri="{28A0092B-C50C-407E-A947-70E740481C1C}">
+                <a14:useLocalDpi xmlns:a14="http://schemas.microsoft.com/office/drawing/2010/main" val="0"/>
+              </a:ext>
+            </a:extLst>
+          </a:blip>
+          <a:stretch>
+            <a:fillRect/>
+          </a:stretch>
+        </p:blipFill>
+        <p:spPr>
+          <a:xfrm>
+            <a:off x="0" y="0"/>
+            <a:ext cx="12192000" cy="6858000"/>
+          </a:xfrm>
+          <a:prstGeom prst="rect">
+            <a:avLst/>
+          </a:prstGeom>
+        </p:spPr>
+      </p:pic>
+      <p:sp>
+        <p:nvSpPr>
+          <p:cNvPr id="5" name="CaixaDeTexto 4">
+            <a:extLst>
+              <a:ext uri="{FF2B5EF4-FFF2-40B4-BE49-F238E27FC236}">
+                <a16:creationId xmlns:a16="http://schemas.microsoft.com/office/drawing/2014/main" id="{37296BF4-EF26-F538-26E9-4DC854B48CD9}"/>
+              </a:ext>
+            </a:extLst>
+          </p:cNvPr>
+          <p:cNvSpPr txBox="1"/>
+          <p:nvPr/>
+        </p:nvSpPr>
+        <p:spPr>
+          <a:xfrm>
+            <a:off x="386861" y="202223"/>
+            <a:ext cx="9064869" cy="2862322"/>
+          </a:xfrm>
+          <a:prstGeom prst="rect">
+            <a:avLst/>
+          </a:prstGeom>
+          <a:noFill/>
+        </p:spPr>
+        <p:txBody>
+          <a:bodyPr wrap="square" rtlCol="0">
+            <a:spAutoFit/>
+          </a:bodyPr>
+          <a:lstStyle/>
+          <a:p>
+            <a:r>
+              <a:rPr lang="en-US" sz="3600" dirty="0" err="1"/>
+              <a:t>Instalação</a:t>
+            </a:r>
+            <a:r>
+              <a:rPr lang="en-US" sz="3600" dirty="0"/>
+              <a:t> do MySQL Workbench</a:t>
+            </a:r>
+          </a:p>
+          <a:p>
+            <a:endParaRPr lang="en-US" sz="3600" dirty="0"/>
+          </a:p>
+          <a:p>
+            <a:pPr marL="285750" indent="-285750">
+              <a:buFont typeface="Wingdings" panose="05000000000000000000" pitchFamily="2" charset="2"/>
+              <a:buChar char="Ø"/>
+            </a:pPr>
+            <a:r>
+              <a:rPr lang="en-US" dirty="0" err="1"/>
+              <a:t>Vídeo</a:t>
+            </a:r>
+            <a:r>
+              <a:rPr lang="en-US" dirty="0"/>
+              <a:t> com </a:t>
+            </a:r>
+            <a:r>
+              <a:rPr lang="en-US" dirty="0" err="1"/>
+              <a:t>os</a:t>
+            </a:r>
+            <a:r>
+              <a:rPr lang="en-US" dirty="0"/>
+              <a:t> </a:t>
+            </a:r>
+            <a:r>
+              <a:rPr lang="en-US" dirty="0" err="1"/>
+              <a:t>detalhes</a:t>
+            </a:r>
+            <a:r>
+              <a:rPr lang="en-US" dirty="0"/>
+              <a:t> da </a:t>
+            </a:r>
+            <a:r>
+              <a:rPr lang="en-US" dirty="0" err="1"/>
+              <a:t>instalação</a:t>
+            </a:r>
+            <a:r>
+              <a:rPr lang="en-US" dirty="0"/>
+              <a:t> no canal do Teams.</a:t>
+            </a:r>
+          </a:p>
+          <a:p>
+            <a:pPr marL="285750" indent="-285750">
+              <a:buFont typeface="Wingdings" panose="05000000000000000000" pitchFamily="2" charset="2"/>
+              <a:buChar char="Ø"/>
+            </a:pPr>
+            <a:r>
+              <a:rPr lang="en-US" dirty="0" err="1"/>
+              <a:t>Arquivo</a:t>
+            </a:r>
+            <a:r>
+              <a:rPr lang="en-US" dirty="0"/>
+              <a:t> com </a:t>
+            </a:r>
+            <a:r>
+              <a:rPr lang="en-US" dirty="0" err="1"/>
+              <a:t>todos</a:t>
+            </a:r>
+            <a:r>
+              <a:rPr lang="en-US" dirty="0"/>
+              <a:t> </a:t>
+            </a:r>
+            <a:r>
+              <a:rPr lang="en-US" dirty="0" err="1"/>
+              <a:t>os</a:t>
+            </a:r>
+            <a:r>
+              <a:rPr lang="en-US" dirty="0"/>
+              <a:t> </a:t>
+            </a:r>
+            <a:r>
+              <a:rPr lang="en-US" dirty="0" err="1"/>
+              <a:t>detalhes</a:t>
+            </a:r>
+            <a:r>
+              <a:rPr lang="en-US" dirty="0"/>
+              <a:t> no TEAMS </a:t>
+            </a:r>
+            <a:r>
+              <a:rPr lang="en-US" dirty="0" err="1"/>
+              <a:t>ou</a:t>
+            </a:r>
+            <a:r>
+              <a:rPr lang="en-US" dirty="0"/>
+              <a:t> no meu </a:t>
+            </a:r>
+            <a:r>
+              <a:rPr lang="en-US" dirty="0" err="1"/>
+              <a:t>repositório</a:t>
+            </a:r>
+            <a:r>
+              <a:rPr lang="en-US" dirty="0"/>
+              <a:t> da </a:t>
+            </a:r>
+            <a:r>
+              <a:rPr lang="en-US" dirty="0" err="1"/>
+              <a:t>disciplina</a:t>
+            </a:r>
+            <a:r>
+              <a:rPr lang="en-US" dirty="0"/>
+              <a:t> no </a:t>
+            </a:r>
+            <a:r>
+              <a:rPr lang="en-US" dirty="0" err="1"/>
+              <a:t>Github</a:t>
+            </a:r>
+            <a:r>
+              <a:rPr lang="en-US" dirty="0"/>
+              <a:t>.</a:t>
+            </a:r>
+          </a:p>
+          <a:p>
+            <a:pPr marL="285750" indent="-285750">
+              <a:buFont typeface="Wingdings" panose="05000000000000000000" pitchFamily="2" charset="2"/>
+              <a:buChar char="Ø"/>
+            </a:pPr>
+            <a:r>
+              <a:rPr lang="en-US" dirty="0"/>
+              <a:t>IMPORTANTE: para </a:t>
+            </a:r>
+            <a:r>
+              <a:rPr lang="en-US" dirty="0" err="1"/>
+              <a:t>facilitar</a:t>
+            </a:r>
+            <a:r>
+              <a:rPr lang="en-US" dirty="0"/>
+              <a:t> entradas posteriores (</a:t>
+            </a:r>
+            <a:r>
+              <a:rPr lang="en-US" dirty="0" err="1"/>
+              <a:t>principalmente</a:t>
+            </a:r>
+            <a:r>
+              <a:rPr lang="en-US" dirty="0"/>
+              <a:t> no </a:t>
+            </a:r>
+            <a:r>
+              <a:rPr lang="en-US" dirty="0" err="1"/>
+              <a:t>projeto</a:t>
+            </a:r>
+            <a:r>
+              <a:rPr lang="en-US" dirty="0"/>
+              <a:t>), </a:t>
+            </a:r>
+            <a:r>
+              <a:rPr lang="en-US" dirty="0" err="1"/>
+              <a:t>recomendo</a:t>
+            </a:r>
+            <a:r>
+              <a:rPr lang="en-US" dirty="0"/>
+              <a:t> </a:t>
+            </a:r>
+            <a:r>
+              <a:rPr lang="en-US" dirty="0" err="1"/>
+              <a:t>colocar</a:t>
+            </a:r>
+            <a:r>
+              <a:rPr lang="en-US" dirty="0"/>
+              <a:t> o </a:t>
+            </a:r>
+            <a:r>
+              <a:rPr lang="en-US" b="1" u="sng" dirty="0" err="1"/>
+              <a:t>nome</a:t>
+            </a:r>
+            <a:r>
+              <a:rPr lang="en-US" b="1" u="sng" dirty="0"/>
+              <a:t> de </a:t>
+            </a:r>
+            <a:r>
+              <a:rPr lang="en-US" b="1" u="sng" dirty="0" err="1"/>
+              <a:t>usuário</a:t>
+            </a:r>
+            <a:r>
+              <a:rPr lang="en-US" b="1" u="sng" dirty="0"/>
+              <a:t> e </a:t>
+            </a:r>
+            <a:r>
+              <a:rPr lang="en-US" b="1" u="sng" dirty="0" err="1"/>
+              <a:t>senha</a:t>
+            </a:r>
+            <a:r>
+              <a:rPr lang="en-US" b="1" u="sng" dirty="0"/>
+              <a:t> </a:t>
+            </a:r>
+            <a:r>
+              <a:rPr lang="en-US" b="1" u="sng" dirty="0" err="1"/>
+              <a:t>como</a:t>
+            </a:r>
+            <a:r>
+              <a:rPr lang="en-US" b="1" u="sng" dirty="0"/>
+              <a:t> “root”</a:t>
+            </a:r>
+            <a:r>
+              <a:rPr lang="en-US" dirty="0"/>
+              <a:t>.</a:t>
+            </a:r>
+          </a:p>
+          <a:p>
+            <a:endParaRPr lang="en-US" dirty="0"/>
+          </a:p>
+          <a:p>
+            <a:endParaRPr lang="pt-BR" dirty="0"/>
+          </a:p>
+        </p:txBody>
+      </p:sp>
+    </p:spTree>
+    <p:extLst>
+      <p:ext uri="{BB962C8B-B14F-4D97-AF65-F5344CB8AC3E}">
+        <p14:creationId xmlns:p14="http://schemas.microsoft.com/office/powerpoint/2010/main" val="3734812818"/>
       </p:ext>
     </p:extLst>
   </p:cSld>

</xml_diff>